<commit_message>
more details on how to fill slides
</commit_message>
<xml_diff>
--- a/src/git_bob/data/blank_template.pptx
+++ b/src/git_bob/data/blank_template.pptx
@@ -144,8 +144,8 @@
         </p:nvSpPr>
         <p:spPr>
           <a:xfrm>
-            <a:off x="513347" y="2638991"/>
-            <a:ext cx="10990793" cy="1923484"/>
+            <a:off x="513347" y="3162211"/>
+            <a:ext cx="10990793" cy="1400264"/>
           </a:xfrm>
         </p:spPr>
         <p:txBody>
@@ -320,7 +320,7 @@
           <a:p>
             <a:fld id="{3203B15E-653A-4B2F-9F5F-14E85920A64B}" type="datetimeFigureOut">
               <a:rPr lang="en-US" smtClean="0"/>
-              <a:t>2/16/2024</a:t>
+              <a:t>11/2/2024</a:t>
             </a:fld>
             <a:endParaRPr lang="en-US"/>
           </a:p>
@@ -393,6 +393,79 @@
               <a:t>‹#›</a:t>
             </a:fld>
             <a:endParaRPr lang="en-US"/>
+          </a:p>
+        </p:txBody>
+      </p:sp>
+      <p:pic>
+        <p:nvPicPr>
+          <p:cNvPr id="8" name="Picture 7" descr="A logo of a rabbit&#10;&#10;Description automatically generated">
+            <a:extLst>
+              <a:ext uri="{FF2B5EF4-FFF2-40B4-BE49-F238E27FC236}">
+                <a16:creationId xmlns:a16="http://schemas.microsoft.com/office/drawing/2014/main" id="{8B904FB1-A44C-3E05-1AA2-E6A41CA3D7CD}"/>
+              </a:ext>
+            </a:extLst>
+          </p:cNvPr>
+          <p:cNvPicPr>
+            <a:picLocks noChangeAspect="1"/>
+          </p:cNvPicPr>
+          <p:nvPr userDrawn="1"/>
+        </p:nvPicPr>
+        <p:blipFill>
+          <a:blip r:embed="rId2">
+            <a:extLst>
+              <a:ext uri="{28A0092B-C50C-407E-A947-70E740481C1C}">
+                <a14:useLocalDpi xmlns:a14="http://schemas.microsoft.com/office/drawing/2010/main" val="0"/>
+              </a:ext>
+            </a:extLst>
+          </a:blip>
+          <a:stretch>
+            <a:fillRect/>
+          </a:stretch>
+        </p:blipFill>
+        <p:spPr>
+          <a:xfrm>
+            <a:off x="9229479" y="338931"/>
+            <a:ext cx="2274660" cy="2274660"/>
+          </a:xfrm>
+          <a:prstGeom prst="rect">
+            <a:avLst/>
+          </a:prstGeom>
+        </p:spPr>
+      </p:pic>
+      <p:sp>
+        <p:nvSpPr>
+          <p:cNvPr id="9" name="TextBox 8">
+            <a:extLst>
+              <a:ext uri="{FF2B5EF4-FFF2-40B4-BE49-F238E27FC236}">
+                <a16:creationId xmlns:a16="http://schemas.microsoft.com/office/drawing/2014/main" id="{DAD2E87B-0044-14AC-077A-45F7434715F0}"/>
+              </a:ext>
+            </a:extLst>
+          </p:cNvPr>
+          <p:cNvSpPr txBox="1"/>
+          <p:nvPr userDrawn="1"/>
+        </p:nvSpPr>
+        <p:spPr>
+          <a:xfrm>
+            <a:off x="9229479" y="2613591"/>
+            <a:ext cx="2274660" cy="523220"/>
+          </a:xfrm>
+          <a:prstGeom prst="rect">
+            <a:avLst/>
+          </a:prstGeom>
+          <a:noFill/>
+        </p:spPr>
+        <p:txBody>
+          <a:bodyPr wrap="square" rtlCol="0">
+            <a:spAutoFit/>
+          </a:bodyPr>
+          <a:lstStyle/>
+          <a:p>
+            <a:pPr algn="ctr"/>
+            <a:r>
+              <a:rPr lang="en-GB" sz="2800" dirty="0"/>
+              <a:t>Slide template</a:t>
+            </a:r>
+            <a:endParaRPr lang="LID4096" sz="2800" dirty="0"/>
           </a:p>
         </p:txBody>
       </p:sp>
@@ -445,7 +518,7 @@
         <p:spPr>
           <a:xfrm>
             <a:off x="277920" y="365125"/>
-            <a:ext cx="11075880" cy="1325563"/>
+            <a:ext cx="10576893" cy="914400"/>
           </a:xfrm>
         </p:spPr>
         <p:txBody>
@@ -475,7 +548,12 @@
             <p:ph idx="1"/>
           </p:nvPr>
         </p:nvSpPr>
-        <p:spPr/>
+        <p:spPr>
+          <a:xfrm>
+            <a:off x="277920" y="1371600"/>
+            <a:ext cx="11075880" cy="4842235"/>
+          </a:xfrm>
+        </p:spPr>
         <p:txBody>
           <a:bodyPr/>
           <a:lstStyle/>
@@ -547,7 +625,7 @@
           <a:p>
             <a:fld id="{3203B15E-653A-4B2F-9F5F-14E85920A64B}" type="datetimeFigureOut">
               <a:rPr lang="en-US" smtClean="0"/>
-              <a:t>2/16/2024</a:t>
+              <a:t>11/2/2024</a:t>
             </a:fld>
             <a:endParaRPr lang="en-US"/>
           </a:p>
@@ -623,6 +701,42 @@
           </a:p>
         </p:txBody>
       </p:sp>
+      <p:pic>
+        <p:nvPicPr>
+          <p:cNvPr id="7" name="Picture 6" descr="A logo of a rabbit&#10;&#10;Description automatically generated">
+            <a:extLst>
+              <a:ext uri="{FF2B5EF4-FFF2-40B4-BE49-F238E27FC236}">
+                <a16:creationId xmlns:a16="http://schemas.microsoft.com/office/drawing/2014/main" id="{1A4FACA9-BBB7-A81F-F7C5-258958D50F1C}"/>
+              </a:ext>
+            </a:extLst>
+          </p:cNvPr>
+          <p:cNvPicPr>
+            <a:picLocks noChangeAspect="1"/>
+          </p:cNvPicPr>
+          <p:nvPr userDrawn="1"/>
+        </p:nvPicPr>
+        <p:blipFill>
+          <a:blip r:embed="rId2">
+            <a:extLst>
+              <a:ext uri="{28A0092B-C50C-407E-A947-70E740481C1C}">
+                <a14:useLocalDpi xmlns:a14="http://schemas.microsoft.com/office/drawing/2010/main" val="0"/>
+              </a:ext>
+            </a:extLst>
+          </a:blip>
+          <a:stretch>
+            <a:fillRect/>
+          </a:stretch>
+        </p:blipFill>
+        <p:spPr>
+          <a:xfrm>
+            <a:off x="10854813" y="338449"/>
+            <a:ext cx="1177255" cy="1177255"/>
+          </a:xfrm>
+          <a:prstGeom prst="rect">
+            <a:avLst/>
+          </a:prstGeom>
+        </p:spPr>
+      </p:pic>
     </p:spTree>
     <p:extLst>
       <p:ext uri="{BB962C8B-B14F-4D97-AF65-F5344CB8AC3E}">
@@ -669,7 +783,12 @@
             <p:ph type="title"/>
           </p:nvPr>
         </p:nvSpPr>
-        <p:spPr/>
+        <p:spPr>
+          <a:xfrm>
+            <a:off x="277920" y="365125"/>
+            <a:ext cx="10576893" cy="914400"/>
+          </a:xfrm>
+        </p:spPr>
         <p:txBody>
           <a:bodyPr/>
           <a:lstStyle/>
@@ -699,7 +818,7 @@
         </p:nvSpPr>
         <p:spPr>
           <a:xfrm>
-            <a:off x="277920" y="1825625"/>
+            <a:off x="277920" y="1371600"/>
             <a:ext cx="5351603" cy="4859380"/>
           </a:xfrm>
         </p:spPr>
@@ -709,35 +828,35 @@
           <a:p>
             <a:pPr lvl="0"/>
             <a:r>
-              <a:rPr lang="en-US"/>
+              <a:rPr lang="en-US" dirty="0"/>
               <a:t>Click to edit Master text styles</a:t>
             </a:r>
           </a:p>
           <a:p>
             <a:pPr lvl="1"/>
             <a:r>
-              <a:rPr lang="en-US"/>
+              <a:rPr lang="en-US" dirty="0"/>
               <a:t>Second level</a:t>
             </a:r>
           </a:p>
           <a:p>
             <a:pPr lvl="2"/>
             <a:r>
-              <a:rPr lang="en-US"/>
+              <a:rPr lang="en-US" dirty="0"/>
               <a:t>Third level</a:t>
             </a:r>
           </a:p>
           <a:p>
             <a:pPr lvl="3"/>
             <a:r>
-              <a:rPr lang="en-US"/>
+              <a:rPr lang="en-US" dirty="0"/>
               <a:t>Fourth level</a:t>
             </a:r>
           </a:p>
           <a:p>
             <a:pPr lvl="4"/>
             <a:r>
-              <a:rPr lang="en-US"/>
+              <a:rPr lang="en-US" dirty="0"/>
               <a:t>Fifth level</a:t>
             </a:r>
           </a:p>
@@ -774,7 +893,7 @@
           <a:p>
             <a:fld id="{3203B15E-653A-4B2F-9F5F-14E85920A64B}" type="datetimeFigureOut">
               <a:rPr lang="en-US" smtClean="0"/>
-              <a:t>2/16/2024</a:t>
+              <a:t>11/2/2024</a:t>
             </a:fld>
             <a:endParaRPr lang="en-US"/>
           </a:p>
@@ -868,7 +987,7 @@
         </p:nvSpPr>
         <p:spPr>
           <a:xfrm>
-            <a:off x="5749743" y="1825625"/>
+            <a:off x="5749743" y="1371600"/>
             <a:ext cx="5351603" cy="4859380"/>
           </a:xfrm>
         </p:spPr>
@@ -912,361 +1031,46 @@
           </a:p>
         </p:txBody>
       </p:sp>
+      <p:pic>
+        <p:nvPicPr>
+          <p:cNvPr id="8" name="Picture 7" descr="A logo of a rabbit&#10;&#10;Description automatically generated">
+            <a:extLst>
+              <a:ext uri="{FF2B5EF4-FFF2-40B4-BE49-F238E27FC236}">
+                <a16:creationId xmlns:a16="http://schemas.microsoft.com/office/drawing/2014/main" id="{573BE852-7DFC-04A5-888E-4998DEDE01F6}"/>
+              </a:ext>
+            </a:extLst>
+          </p:cNvPr>
+          <p:cNvPicPr>
+            <a:picLocks noChangeAspect="1"/>
+          </p:cNvPicPr>
+          <p:nvPr userDrawn="1"/>
+        </p:nvPicPr>
+        <p:blipFill>
+          <a:blip r:embed="rId2">
+            <a:extLst>
+              <a:ext uri="{28A0092B-C50C-407E-A947-70E740481C1C}">
+                <a14:useLocalDpi xmlns:a14="http://schemas.microsoft.com/office/drawing/2010/main" val="0"/>
+              </a:ext>
+            </a:extLst>
+          </a:blip>
+          <a:stretch>
+            <a:fillRect/>
+          </a:stretch>
+        </p:blipFill>
+        <p:spPr>
+          <a:xfrm>
+            <a:off x="10854813" y="338449"/>
+            <a:ext cx="1177255" cy="1177255"/>
+          </a:xfrm>
+          <a:prstGeom prst="rect">
+            <a:avLst/>
+          </a:prstGeom>
+        </p:spPr>
+      </p:pic>
     </p:spTree>
     <p:extLst>
       <p:ext uri="{BB962C8B-B14F-4D97-AF65-F5344CB8AC3E}">
         <p14:creationId xmlns:p14="http://schemas.microsoft.com/office/powerpoint/2010/main" val="1706456452"/>
-      </p:ext>
-    </p:extLst>
-  </p:cSld>
-  <p:clrMapOvr>
-    <a:masterClrMapping/>
-  </p:clrMapOvr>
-</p:sldLayout>
-</file>
-
-<file path=ppt/slideLayouts/slideLayout4.xml><?xml version="1.0" encoding="utf-8"?>
-<p:sldLayout xmlns:a="http://schemas.openxmlformats.org/drawingml/2006/main" xmlns:r="http://schemas.openxmlformats.org/officeDocument/2006/relationships" xmlns:p="http://schemas.openxmlformats.org/presentationml/2006/main" preserve="1" userDrawn="1">
-  <p:cSld name="2_Title and Content">
-    <p:spTree>
-      <p:nvGrpSpPr>
-        <p:cNvPr id="1" name=""/>
-        <p:cNvGrpSpPr/>
-        <p:nvPr/>
-      </p:nvGrpSpPr>
-      <p:grpSpPr>
-        <a:xfrm>
-          <a:off x="0" y="0"/>
-          <a:ext cx="0" cy="0"/>
-          <a:chOff x="0" y="0"/>
-          <a:chExt cx="0" cy="0"/>
-        </a:xfrm>
-      </p:grpSpPr>
-      <p:sp>
-        <p:nvSpPr>
-          <p:cNvPr id="2" name="Title 1">
-            <a:extLst>
-              <a:ext uri="{FF2B5EF4-FFF2-40B4-BE49-F238E27FC236}">
-                <a16:creationId xmlns:a16="http://schemas.microsoft.com/office/drawing/2014/main" id="{693FE1DF-24C7-8F31-40CA-7DDD56AB2A45}"/>
-              </a:ext>
-            </a:extLst>
-          </p:cNvPr>
-          <p:cNvSpPr>
-            <a:spLocks noGrp="1"/>
-          </p:cNvSpPr>
-          <p:nvPr>
-            <p:ph type="title"/>
-          </p:nvPr>
-        </p:nvSpPr>
-        <p:spPr/>
-        <p:txBody>
-          <a:bodyPr/>
-          <a:lstStyle/>
-          <a:p>
-            <a:r>
-              <a:rPr lang="en-US" dirty="0"/>
-              <a:t>Click to edit Master title style</a:t>
-            </a:r>
-          </a:p>
-        </p:txBody>
-      </p:sp>
-      <p:sp>
-        <p:nvSpPr>
-          <p:cNvPr id="3" name="Content Placeholder 2">
-            <a:extLst>
-              <a:ext uri="{FF2B5EF4-FFF2-40B4-BE49-F238E27FC236}">
-                <a16:creationId xmlns:a16="http://schemas.microsoft.com/office/drawing/2014/main" id="{D3874BDC-A125-2F9E-1864-7A4C95462501}"/>
-              </a:ext>
-            </a:extLst>
-          </p:cNvPr>
-          <p:cNvSpPr>
-            <a:spLocks noGrp="1"/>
-          </p:cNvSpPr>
-          <p:nvPr>
-            <p:ph idx="1"/>
-          </p:nvPr>
-        </p:nvSpPr>
-        <p:spPr>
-          <a:xfrm>
-            <a:off x="277921" y="1825624"/>
-            <a:ext cx="3482639" cy="4871737"/>
-          </a:xfrm>
-        </p:spPr>
-        <p:txBody>
-          <a:bodyPr/>
-          <a:lstStyle/>
-          <a:p>
-            <a:pPr lvl="0"/>
-            <a:r>
-              <a:rPr lang="en-US" dirty="0"/>
-              <a:t>Click to edit Master text styles</a:t>
-            </a:r>
-          </a:p>
-          <a:p>
-            <a:pPr lvl="1"/>
-            <a:r>
-              <a:rPr lang="en-US" dirty="0"/>
-              <a:t>Second level</a:t>
-            </a:r>
-          </a:p>
-          <a:p>
-            <a:pPr lvl="2"/>
-            <a:r>
-              <a:rPr lang="en-US" dirty="0"/>
-              <a:t>Third level</a:t>
-            </a:r>
-          </a:p>
-          <a:p>
-            <a:pPr lvl="3"/>
-            <a:r>
-              <a:rPr lang="en-US" dirty="0"/>
-              <a:t>Fourth level</a:t>
-            </a:r>
-          </a:p>
-          <a:p>
-            <a:pPr lvl="4"/>
-            <a:r>
-              <a:rPr lang="en-US" dirty="0"/>
-              <a:t>Fifth level</a:t>
-            </a:r>
-          </a:p>
-        </p:txBody>
-      </p:sp>
-      <p:sp>
-        <p:nvSpPr>
-          <p:cNvPr id="4" name="Date Placeholder 3">
-            <a:extLst>
-              <a:ext uri="{FF2B5EF4-FFF2-40B4-BE49-F238E27FC236}">
-                <a16:creationId xmlns:a16="http://schemas.microsoft.com/office/drawing/2014/main" id="{25656A75-A8B3-C3E1-1DF0-49E36B9141C7}"/>
-              </a:ext>
-            </a:extLst>
-          </p:cNvPr>
-          <p:cNvSpPr>
-            <a:spLocks noGrp="1"/>
-          </p:cNvSpPr>
-          <p:nvPr>
-            <p:ph type="dt" sz="half" idx="10"/>
-          </p:nvPr>
-        </p:nvSpPr>
-        <p:spPr>
-          <a:xfrm>
-            <a:off x="1017360" y="7670780"/>
-            <a:ext cx="2743200" cy="365125"/>
-          </a:xfrm>
-          <a:prstGeom prst="rect">
-            <a:avLst/>
-          </a:prstGeom>
-        </p:spPr>
-        <p:txBody>
-          <a:bodyPr/>
-          <a:lstStyle/>
-          <a:p>
-            <a:fld id="{3203B15E-653A-4B2F-9F5F-14E85920A64B}" type="datetimeFigureOut">
-              <a:rPr lang="en-US" smtClean="0"/>
-              <a:t>2/16/2024</a:t>
-            </a:fld>
-            <a:endParaRPr lang="en-US"/>
-          </a:p>
-        </p:txBody>
-      </p:sp>
-      <p:sp>
-        <p:nvSpPr>
-          <p:cNvPr id="5" name="Footer Placeholder 4">
-            <a:extLst>
-              <a:ext uri="{FF2B5EF4-FFF2-40B4-BE49-F238E27FC236}">
-                <a16:creationId xmlns:a16="http://schemas.microsoft.com/office/drawing/2014/main" id="{7A75E583-EEFA-DE14-BECC-D6DC592B9A83}"/>
-              </a:ext>
-            </a:extLst>
-          </p:cNvPr>
-          <p:cNvSpPr>
-            <a:spLocks noGrp="1"/>
-          </p:cNvSpPr>
-          <p:nvPr>
-            <p:ph type="ftr" sz="quarter" idx="11"/>
-          </p:nvPr>
-        </p:nvSpPr>
-        <p:spPr>
-          <a:xfrm>
-            <a:off x="4037580" y="7471355"/>
-            <a:ext cx="4114800" cy="365125"/>
-          </a:xfrm>
-          <a:prstGeom prst="rect">
-            <a:avLst/>
-          </a:prstGeom>
-        </p:spPr>
-        <p:txBody>
-          <a:bodyPr/>
-          <a:lstStyle/>
-          <a:p>
-            <a:endParaRPr lang="en-US"/>
-          </a:p>
-        </p:txBody>
-      </p:sp>
-      <p:sp>
-        <p:nvSpPr>
-          <p:cNvPr id="6" name="Slide Number Placeholder 5">
-            <a:extLst>
-              <a:ext uri="{FF2B5EF4-FFF2-40B4-BE49-F238E27FC236}">
-                <a16:creationId xmlns:a16="http://schemas.microsoft.com/office/drawing/2014/main" id="{B635FC2C-00F2-0019-9A0E-EE02075C672B}"/>
-              </a:ext>
-            </a:extLst>
-          </p:cNvPr>
-          <p:cNvSpPr>
-            <a:spLocks noGrp="1"/>
-          </p:cNvSpPr>
-          <p:nvPr>
-            <p:ph type="sldNum" sz="quarter" idx="12"/>
-          </p:nvPr>
-        </p:nvSpPr>
-        <p:spPr>
-          <a:xfrm>
-            <a:off x="7155720" y="7974133"/>
-            <a:ext cx="2743200" cy="365125"/>
-          </a:xfrm>
-          <a:prstGeom prst="rect">
-            <a:avLst/>
-          </a:prstGeom>
-        </p:spPr>
-        <p:txBody>
-          <a:bodyPr/>
-          <a:lstStyle/>
-          <a:p>
-            <a:fld id="{1E909D46-20F9-4BDB-ADE5-B8144AAAE811}" type="slidenum">
-              <a:rPr lang="en-US" smtClean="0"/>
-              <a:t>‹#›</a:t>
-            </a:fld>
-            <a:endParaRPr lang="en-US"/>
-          </a:p>
-        </p:txBody>
-      </p:sp>
-      <p:sp>
-        <p:nvSpPr>
-          <p:cNvPr id="7" name="Content Placeholder 2">
-            <a:extLst>
-              <a:ext uri="{FF2B5EF4-FFF2-40B4-BE49-F238E27FC236}">
-                <a16:creationId xmlns:a16="http://schemas.microsoft.com/office/drawing/2014/main" id="{24508932-E1ED-73ED-A1E2-C073DD72DC0F}"/>
-              </a:ext>
-            </a:extLst>
-          </p:cNvPr>
-          <p:cNvSpPr>
-            <a:spLocks noGrp="1"/>
-          </p:cNvSpPr>
-          <p:nvPr>
-            <p:ph idx="13"/>
-          </p:nvPr>
-        </p:nvSpPr>
-        <p:spPr>
-          <a:xfrm>
-            <a:off x="3889139" y="1825624"/>
-            <a:ext cx="3482639" cy="4871737"/>
-          </a:xfrm>
-        </p:spPr>
-        <p:txBody>
-          <a:bodyPr/>
-          <a:lstStyle/>
-          <a:p>
-            <a:pPr lvl="0"/>
-            <a:r>
-              <a:rPr lang="en-US" dirty="0"/>
-              <a:t>Click to edit Master text styles</a:t>
-            </a:r>
-          </a:p>
-          <a:p>
-            <a:pPr lvl="1"/>
-            <a:r>
-              <a:rPr lang="en-US" dirty="0"/>
-              <a:t>Second level</a:t>
-            </a:r>
-          </a:p>
-          <a:p>
-            <a:pPr lvl="2"/>
-            <a:r>
-              <a:rPr lang="en-US" dirty="0"/>
-              <a:t>Third level</a:t>
-            </a:r>
-          </a:p>
-          <a:p>
-            <a:pPr lvl="3"/>
-            <a:r>
-              <a:rPr lang="en-US" dirty="0"/>
-              <a:t>Fourth level</a:t>
-            </a:r>
-          </a:p>
-          <a:p>
-            <a:pPr lvl="4"/>
-            <a:r>
-              <a:rPr lang="en-US" dirty="0"/>
-              <a:t>Fifth level</a:t>
-            </a:r>
-          </a:p>
-        </p:txBody>
-      </p:sp>
-      <p:sp>
-        <p:nvSpPr>
-          <p:cNvPr id="8" name="Content Placeholder 2">
-            <a:extLst>
-              <a:ext uri="{FF2B5EF4-FFF2-40B4-BE49-F238E27FC236}">
-                <a16:creationId xmlns:a16="http://schemas.microsoft.com/office/drawing/2014/main" id="{28F53D0E-1635-367F-8509-49B0189A8547}"/>
-              </a:ext>
-            </a:extLst>
-          </p:cNvPr>
-          <p:cNvSpPr>
-            <a:spLocks noGrp="1"/>
-          </p:cNvSpPr>
-          <p:nvPr>
-            <p:ph idx="14"/>
-          </p:nvPr>
-        </p:nvSpPr>
-        <p:spPr>
-          <a:xfrm>
-            <a:off x="7500357" y="1825624"/>
-            <a:ext cx="3482639" cy="4871737"/>
-          </a:xfrm>
-        </p:spPr>
-        <p:txBody>
-          <a:bodyPr/>
-          <a:lstStyle/>
-          <a:p>
-            <a:pPr lvl="0"/>
-            <a:r>
-              <a:rPr lang="en-US" dirty="0"/>
-              <a:t>Click to edit Master text styles</a:t>
-            </a:r>
-          </a:p>
-          <a:p>
-            <a:pPr lvl="1"/>
-            <a:r>
-              <a:rPr lang="en-US" dirty="0"/>
-              <a:t>Second level</a:t>
-            </a:r>
-          </a:p>
-          <a:p>
-            <a:pPr lvl="2"/>
-            <a:r>
-              <a:rPr lang="en-US" dirty="0"/>
-              <a:t>Third level</a:t>
-            </a:r>
-          </a:p>
-          <a:p>
-            <a:pPr lvl="3"/>
-            <a:r>
-              <a:rPr lang="en-US" dirty="0"/>
-              <a:t>Fourth level</a:t>
-            </a:r>
-          </a:p>
-          <a:p>
-            <a:pPr lvl="4"/>
-            <a:r>
-              <a:rPr lang="en-US" dirty="0"/>
-              <a:t>Fifth level</a:t>
-            </a:r>
-          </a:p>
-        </p:txBody>
-      </p:sp>
-    </p:spTree>
-    <p:extLst>
-      <p:ext uri="{BB962C8B-B14F-4D97-AF65-F5344CB8AC3E}">
-        <p14:creationId xmlns:p14="http://schemas.microsoft.com/office/powerpoint/2010/main" val="3149830407"/>
       </p:ext>
     </p:extLst>
   </p:cSld>
@@ -1567,7 +1371,6 @@
     <p:sldLayoutId id="2147483690" r:id="rId1"/>
     <p:sldLayoutId id="2147483689" r:id="rId2"/>
     <p:sldLayoutId id="2147483691" r:id="rId3"/>
-    <p:sldLayoutId id="2147483692" r:id="rId4"/>
   </p:sldLayoutIdLst>
   <p:txStyles>
     <p:titleStyle>

</xml_diff>